<commit_message>
Completed poster. In review process.
</commit_message>
<xml_diff>
--- a/tex/final poster/Moss Clement McGee Miller Project Poster.pptx
+++ b/tex/final poster/Moss Clement McGee Miller Project Poster.pptx
@@ -1445,8 +1445,8 @@
         </p:nvSpPr>
         <p:spPr bwMode="auto">
           <a:xfrm>
-            <a:off x="704583" y="5480053"/>
-            <a:ext cx="7334250" cy="8683688"/>
+            <a:off x="704582" y="5375784"/>
+            <a:ext cx="7334250" cy="8991464"/>
           </a:xfrm>
           <a:prstGeom prst="rect">
             <a:avLst/>
@@ -1570,7 +1570,14 @@
                 <a:latin typeface="Times New Roman" panose="02020603050405020304" pitchFamily="18" charset="0"/>
                 <a:cs typeface="Times New Roman" panose="02020603050405020304" pitchFamily="18" charset="0"/>
               </a:rPr>
-              <a:t>RotationCurve.org intends to solve both of these problems by providing a space to generalize </a:t>
+              <a:t>This astronomical project intends </a:t>
+            </a:r>
+            <a:r>
+              <a:rPr lang="en-US" sz="2000" dirty="0" smtClean="0">
+                <a:latin typeface="Times New Roman" panose="02020603050405020304" pitchFamily="18" charset="0"/>
+                <a:cs typeface="Times New Roman" panose="02020603050405020304" pitchFamily="18" charset="0"/>
+              </a:rPr>
+              <a:t>to solve both of these problems by providing a space to generalize </a:t>
             </a:r>
             <a:r>
               <a:rPr lang="en-US" sz="2000" dirty="0">
@@ -1647,7 +1654,21 @@
                 <a:latin typeface="Times New Roman" panose="02020603050405020304" pitchFamily="18" charset="0"/>
                 <a:cs typeface="Times New Roman" panose="02020603050405020304" pitchFamily="18" charset="0"/>
               </a:rPr>
-              <a:t>      Scholarly Observed Celestial Measurements (SOCM) will serve as both a central database and API (Application Programming Interface) for researchers and programmers alike. SOCM includes galactic data collected on </a:t>
+              <a:t>      Scholarly Observed Celestial Measurements (SOCM) </a:t>
+            </a:r>
+            <a:r>
+              <a:rPr lang="en-US" sz="2000" dirty="0" smtClean="0">
+                <a:latin typeface="Times New Roman" panose="02020603050405020304" pitchFamily="18" charset="0"/>
+                <a:cs typeface="Times New Roman" panose="02020603050405020304" pitchFamily="18" charset="0"/>
+              </a:rPr>
+              <a:t>serves </a:t>
+            </a:r>
+            <a:r>
+              <a:rPr lang="en-US" sz="2000" dirty="0" smtClean="0">
+                <a:latin typeface="Times New Roman" panose="02020603050405020304" pitchFamily="18" charset="0"/>
+                <a:cs typeface="Times New Roman" panose="02020603050405020304" pitchFamily="18" charset="0"/>
+              </a:rPr>
+              <a:t>as both a central database and API (Application Programming Interface) for researchers and programmers alike. SOCM includes galactic data collected on </a:t>
             </a:r>
             <a:r>
               <a:rPr lang="en-US" sz="2000" dirty="0" smtClean="0">
@@ -1671,21 +1692,77 @@
                 <a:latin typeface="Times New Roman" panose="02020603050405020304" pitchFamily="18" charset="0"/>
                 <a:cs typeface="Times New Roman" panose="02020603050405020304" pitchFamily="18" charset="0"/>
               </a:rPr>
-              <a:t>      The Rotation Curve Modeler (RoCM) will serve as a visual modeler for our collections of data and contemporary theories within </a:t>
-            </a:r>
-            <a:r>
-              <a:rPr lang="en-US" sz="2000" dirty="0" smtClean="0">
-                <a:latin typeface="Times New Roman" panose="02020603050405020304" pitchFamily="18" charset="0"/>
-                <a:cs typeface="Times New Roman" panose="02020603050405020304" pitchFamily="18" charset="0"/>
-              </a:rPr>
-              <a:t>astrophysics that solve the rotation curve problem. </a:t>
-            </a:r>
-            <a:r>
-              <a:rPr lang="en-US" sz="2000" dirty="0" smtClean="0">
-                <a:latin typeface="Times New Roman" panose="02020603050405020304" pitchFamily="18" charset="0"/>
-                <a:cs typeface="Times New Roman" panose="02020603050405020304" pitchFamily="18" charset="0"/>
-              </a:rPr>
-              <a:t>With observable data as the input (via SOCM), any galaxy can be imported into the tool. The tool will plot observational data and multiple galactic models together as a graph, as well as enable users to import their own galactic models to test against existing theories. Sliders will allow users to control </a:t>
+              <a:t>      The Rotation Curve Modeler (RoCM) </a:t>
+            </a:r>
+            <a:r>
+              <a:rPr lang="en-US" sz="2000" dirty="0" smtClean="0">
+                <a:latin typeface="Times New Roman" panose="02020603050405020304" pitchFamily="18" charset="0"/>
+                <a:cs typeface="Times New Roman" panose="02020603050405020304" pitchFamily="18" charset="0"/>
+              </a:rPr>
+              <a:t>serves </a:t>
+            </a:r>
+            <a:r>
+              <a:rPr lang="en-US" sz="2000" dirty="0" smtClean="0">
+                <a:latin typeface="Times New Roman" panose="02020603050405020304" pitchFamily="18" charset="0"/>
+                <a:cs typeface="Times New Roman" panose="02020603050405020304" pitchFamily="18" charset="0"/>
+              </a:rPr>
+              <a:t>as a </a:t>
+            </a:r>
+            <a:r>
+              <a:rPr lang="en-US" sz="2000" dirty="0" smtClean="0">
+                <a:latin typeface="Times New Roman" panose="02020603050405020304" pitchFamily="18" charset="0"/>
+                <a:cs typeface="Times New Roman" panose="02020603050405020304" pitchFamily="18" charset="0"/>
+              </a:rPr>
+              <a:t>tool to model the rotation of star clusters around the center of a galaxy. It’s purpose is to test all existing galactic models against the observational data for that specified galaxy. </a:t>
+            </a:r>
+            <a:r>
+              <a:rPr lang="en-US" sz="2000" dirty="0" smtClean="0">
+                <a:latin typeface="Times New Roman" panose="02020603050405020304" pitchFamily="18" charset="0"/>
+                <a:cs typeface="Times New Roman" panose="02020603050405020304" pitchFamily="18" charset="0"/>
+              </a:rPr>
+              <a:t>With observable data as the input (via SOCM), </a:t>
+            </a:r>
+            <a:r>
+              <a:rPr lang="en-US" sz="2000" dirty="0" smtClean="0">
+                <a:latin typeface="Times New Roman" panose="02020603050405020304" pitchFamily="18" charset="0"/>
+                <a:cs typeface="Times New Roman" panose="02020603050405020304" pitchFamily="18" charset="0"/>
+              </a:rPr>
+              <a:t>any arbitrary </a:t>
+            </a:r>
+            <a:r>
+              <a:rPr lang="en-US" sz="2000" dirty="0" smtClean="0">
+                <a:latin typeface="Times New Roman" panose="02020603050405020304" pitchFamily="18" charset="0"/>
+                <a:cs typeface="Times New Roman" panose="02020603050405020304" pitchFamily="18" charset="0"/>
+              </a:rPr>
+              <a:t>galaxy can be imported into the tool. The tool will plot observational data and multiple galactic models together as a graph, </a:t>
+            </a:r>
+            <a:r>
+              <a:rPr lang="en-US" sz="2000" dirty="0" smtClean="0">
+                <a:latin typeface="Times New Roman" panose="02020603050405020304" pitchFamily="18" charset="0"/>
+                <a:cs typeface="Times New Roman" panose="02020603050405020304" pitchFamily="18" charset="0"/>
+              </a:rPr>
+              <a:t>and enables </a:t>
+            </a:r>
+            <a:r>
+              <a:rPr lang="en-US" sz="2000" dirty="0" smtClean="0">
+                <a:latin typeface="Times New Roman" panose="02020603050405020304" pitchFamily="18" charset="0"/>
+                <a:cs typeface="Times New Roman" panose="02020603050405020304" pitchFamily="18" charset="0"/>
+              </a:rPr>
+              <a:t>users to import their own galactic models to test against existing theories. </a:t>
+            </a:r>
+            <a:r>
+              <a:rPr lang="en-US" sz="2000" dirty="0" smtClean="0">
+                <a:latin typeface="Times New Roman" panose="02020603050405020304" pitchFamily="18" charset="0"/>
+                <a:cs typeface="Times New Roman" panose="02020603050405020304" pitchFamily="18" charset="0"/>
+              </a:rPr>
+              <a:t>Parameter value sliders allow </a:t>
+            </a:r>
+            <a:r>
+              <a:rPr lang="en-US" sz="2000" dirty="0" smtClean="0">
+                <a:latin typeface="Times New Roman" panose="02020603050405020304" pitchFamily="18" charset="0"/>
+                <a:cs typeface="Times New Roman" panose="02020603050405020304" pitchFamily="18" charset="0"/>
+              </a:rPr>
+              <a:t>users to control </a:t>
             </a:r>
             <a:r>
               <a:rPr lang="en-US" sz="2000" dirty="0" smtClean="0">
@@ -1716,25 +1793,32 @@
               <a:t>(</a:t>
             </a:r>
             <a:r>
-              <a:rPr lang="en-US" sz="2000" dirty="0" err="1" smtClean="0">
-                <a:latin typeface="Times New Roman" panose="02020603050405020304" pitchFamily="18" charset="0"/>
-                <a:cs typeface="Times New Roman" panose="02020603050405020304" pitchFamily="18" charset="0"/>
-              </a:rPr>
-              <a:t>RoCS</a:t>
-            </a:r>
-            <a:r>
-              <a:rPr lang="en-US" sz="2000" dirty="0" smtClean="0">
-                <a:latin typeface="Times New Roman" panose="02020603050405020304" pitchFamily="18" charset="0"/>
-                <a:cs typeface="Times New Roman" panose="02020603050405020304" pitchFamily="18" charset="0"/>
-              </a:rPr>
-              <a:t>) </a:t>
-            </a:r>
-            <a:r>
-              <a:rPr lang="en-US" sz="2000" dirty="0" smtClean="0">
-                <a:latin typeface="Times New Roman" panose="02020603050405020304" pitchFamily="18" charset="0"/>
-                <a:cs typeface="Times New Roman" panose="02020603050405020304" pitchFamily="18" charset="0"/>
-              </a:rPr>
-              <a:t>to view their models against the data in three-dimensional rendering.</a:t>
+              <a:rPr lang="en-US" sz="2000" dirty="0" smtClean="0">
+                <a:latin typeface="Times New Roman" panose="02020603050405020304" pitchFamily="18" charset="0"/>
+                <a:cs typeface="Times New Roman" panose="02020603050405020304" pitchFamily="18" charset="0"/>
+              </a:rPr>
+              <a:t>RoCS) </a:t>
+            </a:r>
+            <a:r>
+              <a:rPr lang="en-US" sz="2000" dirty="0" smtClean="0">
+                <a:latin typeface="Times New Roman" panose="02020603050405020304" pitchFamily="18" charset="0"/>
+                <a:cs typeface="Times New Roman" panose="02020603050405020304" pitchFamily="18" charset="0"/>
+              </a:rPr>
+              <a:t>to view their models against the data in </a:t>
+            </a:r>
+            <a:r>
+              <a:rPr lang="en-US" sz="2000" dirty="0" smtClean="0">
+                <a:latin typeface="Times New Roman" panose="02020603050405020304" pitchFamily="18" charset="0"/>
+                <a:cs typeface="Times New Roman" panose="02020603050405020304" pitchFamily="18" charset="0"/>
+              </a:rPr>
+              <a:t>two-dimensional </a:t>
+            </a:r>
+            <a:r>
+              <a:rPr lang="en-US" sz="2000" dirty="0" smtClean="0">
+                <a:latin typeface="Times New Roman" panose="02020603050405020304" pitchFamily="18" charset="0"/>
+                <a:cs typeface="Times New Roman" panose="02020603050405020304" pitchFamily="18" charset="0"/>
+              </a:rPr>
+              <a:t>rendering.</a:t>
             </a:r>
             <a:endParaRPr lang="en-US" sz="2000" dirty="0">
               <a:latin typeface="Times New Roman" panose="02020603050405020304" pitchFamily="18" charset="0"/>
@@ -1753,8 +1837,8 @@
         </p:nvSpPr>
         <p:spPr bwMode="auto">
           <a:xfrm>
-            <a:off x="8686800" y="4221130"/>
-            <a:ext cx="7372350" cy="1004662"/>
+            <a:off x="8686799" y="4272235"/>
+            <a:ext cx="7372350" cy="896940"/>
           </a:xfrm>
           <a:prstGeom prst="rect">
             <a:avLst/>
@@ -1780,10 +1864,10 @@
               </a:spcBef>
             </a:pPr>
             <a:r>
-              <a:rPr lang="en-US" b="1" dirty="0" smtClean="0"/>
+              <a:rPr lang="en-US" sz="5400" b="1" dirty="0" smtClean="0"/>
               <a:t>Design</a:t>
             </a:r>
-            <a:endParaRPr lang="en-US" b="1" dirty="0"/>
+            <a:endParaRPr lang="en-US" sz="5400" b="1" dirty="0"/>
           </a:p>
         </p:txBody>
       </p:sp>
@@ -1797,8 +1881,8 @@
         </p:nvSpPr>
         <p:spPr bwMode="auto">
           <a:xfrm>
-            <a:off x="24917400" y="15184529"/>
-            <a:ext cx="7372350" cy="1004662"/>
+            <a:off x="24872565" y="15156437"/>
+            <a:ext cx="7372350" cy="896940"/>
           </a:xfrm>
           <a:prstGeom prst="rect">
             <a:avLst/>
@@ -1824,7 +1908,7 @@
               </a:spcBef>
             </a:pPr>
             <a:r>
-              <a:rPr lang="en-US" b="1" dirty="0"/>
+              <a:rPr lang="en-US" sz="5400" b="1" dirty="0"/>
               <a:t>Conclusions</a:t>
             </a:r>
           </a:p>
@@ -1912,7 +1996,7 @@
         </p:nvSpPr>
         <p:spPr bwMode="auto">
           <a:xfrm>
-            <a:off x="5631875" y="601040"/>
+            <a:off x="5631875" y="498858"/>
             <a:ext cx="22283878" cy="4082428"/>
           </a:xfrm>
           <a:prstGeom prst="rect">
@@ -2027,17 +2111,8 @@
               <a:rPr lang="en-US" sz="3200" dirty="0" smtClean="0">
                 <a:latin typeface="Cambria" pitchFamily="18" charset="0"/>
               </a:rPr>
-              <a:t>Professor Lisa MacLean, and Professor Mohammed </a:t>
-            </a:r>
-            <a:r>
-              <a:rPr lang="en-US" sz="3200" dirty="0" err="1" smtClean="0">
-                <a:latin typeface="Cambria" pitchFamily="18" charset="0"/>
-              </a:rPr>
-              <a:t>Anwaruddin</a:t>
-            </a:r>
-            <a:endParaRPr lang="en-US" sz="3200" dirty="0" smtClean="0">
-              <a:latin typeface="Cambria" pitchFamily="18" charset="0"/>
-            </a:endParaRPr>
+              <a:t>Lisa MacLean, and Mohammed Anwaruddin</a:t>
+            </a:r>
           </a:p>
           <a:p>
             <a:pPr defTabSz="3134937"/>
@@ -2084,7 +2159,7 @@
         </p:nvSpPr>
         <p:spPr bwMode="auto">
           <a:xfrm>
-            <a:off x="8532884" y="11062804"/>
+            <a:off x="8532884" y="11092244"/>
             <a:ext cx="7866314" cy="804608"/>
           </a:xfrm>
           <a:prstGeom prst="rect">
@@ -2127,7 +2202,7 @@
         </p:nvSpPr>
         <p:spPr bwMode="auto">
           <a:xfrm>
-            <a:off x="16861644" y="4364567"/>
+            <a:off x="16847889" y="4364567"/>
             <a:ext cx="7137798" cy="804608"/>
           </a:xfrm>
           <a:prstGeom prst="rect">
@@ -2158,49 +2233,6 @@
               <a:t>Rotation Curve Modeler</a:t>
             </a:r>
             <a:endParaRPr lang="en-US" sz="4800" b="1" dirty="0"/>
-          </a:p>
-        </p:txBody>
-      </p:sp>
-      <p:sp>
-        <p:nvSpPr>
-          <p:cNvPr id="2075" name="Text Box 27"/>
-          <p:cNvSpPr txBox="1">
-            <a:spLocks noChangeArrowheads="1"/>
-          </p:cNvSpPr>
-          <p:nvPr/>
-        </p:nvSpPr>
-        <p:spPr bwMode="auto">
-          <a:xfrm>
-            <a:off x="25151746" y="20031162"/>
-            <a:ext cx="6229350" cy="435276"/>
-          </a:xfrm>
-          <a:prstGeom prst="rect">
-            <a:avLst/>
-          </a:prstGeom>
-          <a:noFill/>
-          <a:ln w="9525">
-            <a:noFill/>
-            <a:miter lim="800000"/>
-            <a:headEnd/>
-            <a:tailEnd/>
-          </a:ln>
-          <a:effectLst/>
-        </p:spPr>
-        <p:txBody>
-          <a:bodyPr lIns="65306" tIns="32653" rIns="65306" bIns="32653">
-            <a:spAutoFit/>
-          </a:bodyPr>
-          <a:lstStyle/>
-          <a:p>
-            <a:pPr defTabSz="3134937">
-              <a:spcBef>
-                <a:spcPct val="50000"/>
-              </a:spcBef>
-            </a:pPr>
-            <a:r>
-              <a:rPr lang="en-US" sz="2400" dirty="0"/>
-              <a:t>Bibliography</a:t>
-            </a:r>
           </a:p>
         </p:txBody>
       </p:sp>
@@ -2269,7 +2301,25 @@
               <a:rPr lang="en-US" sz="2000" dirty="0" smtClean="0">
                 <a:latin typeface="Times New Roman" pitchFamily="18" charset="0"/>
               </a:rPr>
-              <a:t>The galaxies page consists of a paginated table containing the relevant higher-level information of galaxies, including their relative distance from the sun, luminosity, </a:t>
+              <a:t>The galaxies page consists of a paginated table containing the relevant higher-level information of galaxies, including their relative distance from </a:t>
+            </a:r>
+            <a:r>
+              <a:rPr lang="en-US" sz="2000" dirty="0" smtClean="0">
+                <a:latin typeface="Times New Roman" pitchFamily="18" charset="0"/>
+              </a:rPr>
+              <a:t>our</a:t>
+            </a:r>
+            <a:r>
+              <a:rPr lang="en-US" sz="2000" dirty="0" smtClean="0">
+                <a:latin typeface="Times New Roman" pitchFamily="18" charset="0"/>
+              </a:rPr>
+              <a:t> </a:t>
+            </a:r>
+            <a:r>
+              <a:rPr lang="en-US" sz="2000" dirty="0" smtClean="0">
+                <a:latin typeface="Times New Roman" pitchFamily="18" charset="0"/>
+              </a:rPr>
+              <a:t>sun, luminosity, </a:t>
             </a:r>
             <a:r>
               <a:rPr lang="en-US" sz="2000" dirty="0" smtClean="0">
@@ -2293,7 +2343,25 @@
               <a:rPr lang="en-US" sz="2000" dirty="0" smtClean="0">
                 <a:latin typeface="Times New Roman" pitchFamily="18" charset="0"/>
               </a:rPr>
-              <a:t>more. Selecting one of these tables allows users to view the collected velocity measurements of stars for this galaxy, including respective distances from the center of the galaxy, the observed rotation speed, and the calculated errors of these measurements. The citations page lists the papers from which these measurements are referenced.</a:t>
+              <a:t>more. Selecting one of these tables allows users to view the collected velocity measurements of stars for this galaxy, including respective distances from the center of the galaxy, the observed rotation </a:t>
+            </a:r>
+            <a:r>
+              <a:rPr lang="en-US" sz="2000" dirty="0" smtClean="0">
+                <a:latin typeface="Times New Roman" pitchFamily="18" charset="0"/>
+              </a:rPr>
+              <a:t>velocity</a:t>
+            </a:r>
+            <a:r>
+              <a:rPr lang="en-US" sz="2000" dirty="0" smtClean="0">
+                <a:latin typeface="Times New Roman" pitchFamily="18" charset="0"/>
+              </a:rPr>
+              <a:t>, </a:t>
+            </a:r>
+            <a:r>
+              <a:rPr lang="en-US" sz="2000" dirty="0" smtClean="0">
+                <a:latin typeface="Times New Roman" pitchFamily="18" charset="0"/>
+              </a:rPr>
+              <a:t>and the calculated errors of these measurements. The citations page lists the papers from which these measurements are referenced.</a:t>
             </a:r>
           </a:p>
           <a:p>
@@ -2309,28 +2377,10 @@
               <a:t>	</a:t>
             </a:r>
             <a:r>
-              <a:rPr lang="en-US" sz="2000" dirty="0" err="1" smtClean="0">
-                <a:latin typeface="Times New Roman" pitchFamily="18" charset="0"/>
-              </a:rPr>
-              <a:t>RoCM</a:t>
-            </a:r>
-            <a:r>
-              <a:rPr lang="en-US" sz="2000" dirty="0" smtClean="0">
-                <a:latin typeface="Times New Roman" pitchFamily="18" charset="0"/>
-              </a:rPr>
-              <a:t> and </a:t>
-            </a:r>
-            <a:r>
-              <a:rPr lang="en-US" sz="2000" dirty="0" err="1" smtClean="0">
-                <a:latin typeface="Times New Roman" pitchFamily="18" charset="0"/>
-              </a:rPr>
-              <a:t>RoCS</a:t>
-            </a:r>
-            <a:r>
-              <a:rPr lang="en-US" sz="2000" dirty="0" smtClean="0">
-                <a:latin typeface="Times New Roman" pitchFamily="18" charset="0"/>
-              </a:rPr>
-              <a:t> utilize the API provided by SOCM, querying for these high-level galaxy parameters and the galaxies’ constituent velocity measurements. Responses from the API come in the form of JSON (JavaScript Object Notation) objects, which can be parsed and utilized for application purposes.</a:t>
+              <a:rPr lang="en-US" sz="2000" dirty="0" smtClean="0">
+                <a:latin typeface="Times New Roman" pitchFamily="18" charset="0"/>
+              </a:rPr>
+              <a:t>RoCM and RoCS utilize the API provided by SOCM, querying for these high-level galaxy parameters and the galaxies’ constituent velocity measurements. Responses from the API come in the form of JSON (JavaScript Object Notation) objects, which can be parsed and utilized for application purposes.</a:t>
             </a:r>
             <a:endParaRPr lang="en-US" sz="1400" dirty="0">
               <a:latin typeface="Times New Roman" pitchFamily="18" charset="0"/>
@@ -2348,8 +2398,8 @@
         </p:nvSpPr>
         <p:spPr bwMode="auto">
           <a:xfrm>
-            <a:off x="25056703" y="20248800"/>
-            <a:ext cx="6890147" cy="921276"/>
+            <a:off x="25056703" y="20531454"/>
+            <a:ext cx="6890147" cy="745843"/>
           </a:xfrm>
           <a:prstGeom prst="rect">
             <a:avLst/>
@@ -2374,7 +2424,7 @@
                 <a:spcPct val="95000"/>
               </a:lnSpc>
             </a:pPr>
-            <a:endParaRPr lang="en-US" sz="2000" u="sng" dirty="0">
+            <a:endParaRPr lang="en-US" sz="1600" u="sng" dirty="0">
               <a:latin typeface="Times New Roman" pitchFamily="18" charset="0"/>
             </a:endParaRPr>
           </a:p>
@@ -2387,60 +2437,60 @@
               <a:buAutoNum type="arabicPeriod"/>
             </a:pPr>
             <a:r>
-              <a:rPr lang="en-US" sz="2000" dirty="0" err="1" smtClean="0">
+              <a:rPr lang="en-US" sz="1600" dirty="0" err="1" smtClean="0">
                 <a:latin typeface="Times New Roman" pitchFamily="18" charset="0"/>
               </a:rPr>
               <a:t>Bostock</a:t>
             </a:r>
             <a:r>
-              <a:rPr lang="en-US" sz="2000" dirty="0" smtClean="0">
+              <a:rPr lang="en-US" sz="1600" dirty="0" smtClean="0">
                 <a:latin typeface="Times New Roman" pitchFamily="18" charset="0"/>
               </a:rPr>
               <a:t>, Mike; “Data-Driven </a:t>
             </a:r>
             <a:r>
-              <a:rPr lang="en-US" sz="2000" dirty="0">
+              <a:rPr lang="en-US" sz="1600" dirty="0">
                 <a:latin typeface="Times New Roman" pitchFamily="18" charset="0"/>
               </a:rPr>
               <a:t>Documents”; </a:t>
             </a:r>
             <a:r>
-              <a:rPr lang="en-US" sz="2000" dirty="0" smtClean="0">
+              <a:rPr lang="en-US" sz="1600" dirty="0" smtClean="0">
                 <a:latin typeface="Times New Roman" pitchFamily="18" charset="0"/>
               </a:rPr>
               <a:t>Last updated: 2013; Last </a:t>
             </a:r>
             <a:r>
-              <a:rPr lang="en-US" sz="2000" dirty="0" err="1">
+              <a:rPr lang="en-US" sz="1600" dirty="0" err="1">
                 <a:latin typeface="Times New Roman" pitchFamily="18" charset="0"/>
               </a:rPr>
               <a:t>v</a:t>
             </a:r>
             <a:r>
-              <a:rPr lang="en-US" sz="2000" dirty="0" err="1" smtClean="0">
+              <a:rPr lang="en-US" sz="1600" dirty="0" err="1" smtClean="0">
                 <a:latin typeface="Times New Roman" pitchFamily="18" charset="0"/>
               </a:rPr>
               <a:t>isisted</a:t>
             </a:r>
             <a:r>
-              <a:rPr lang="en-US" sz="2000" dirty="0" smtClean="0">
+              <a:rPr lang="en-US" sz="1600" dirty="0" smtClean="0">
                 <a:latin typeface="Times New Roman" pitchFamily="18" charset="0"/>
               </a:rPr>
               <a:t>: July 28, 2014; http</a:t>
             </a:r>
             <a:r>
-              <a:rPr lang="en-US" sz="2000" dirty="0">
+              <a:rPr lang="en-US" sz="1600" dirty="0">
                 <a:latin typeface="Times New Roman" pitchFamily="18" charset="0"/>
               </a:rPr>
               <a:t>://d3js.org</a:t>
             </a:r>
             <a:r>
-              <a:rPr lang="en-US" sz="2000" dirty="0" smtClean="0">
+              <a:rPr lang="en-US" sz="1600" dirty="0" smtClean="0">
                 <a:latin typeface="Times New Roman" pitchFamily="18" charset="0"/>
               </a:rPr>
               <a:t>/</a:t>
             </a:r>
-            <a:endParaRPr lang="en-US" sz="2000" dirty="0">
+            <a:endParaRPr lang="en-US" sz="1600" dirty="0">
               <a:latin typeface="Times New Roman" pitchFamily="18" charset="0"/>
             </a:endParaRPr>
           </a:p>
@@ -2456,8 +2506,8 @@
         </p:nvSpPr>
         <p:spPr bwMode="auto">
           <a:xfrm>
-            <a:off x="24879299" y="16285430"/>
-            <a:ext cx="7267575" cy="3552765"/>
+            <a:off x="24857459" y="16162880"/>
+            <a:ext cx="7320781" cy="4137541"/>
           </a:xfrm>
           <a:prstGeom prst="rect">
             <a:avLst/>
@@ -2472,7 +2522,7 @@
           <a:effectLst/>
         </p:spPr>
         <p:txBody>
-          <a:bodyPr lIns="43688" tIns="21843" rIns="43688" bIns="21843">
+          <a:bodyPr wrap="square" lIns="43688" tIns="21843" rIns="43688" bIns="21843">
             <a:spAutoFit/>
           </a:bodyPr>
           <a:lstStyle/>
@@ -2522,31 +2572,7 @@
               <a:rPr lang="en-US" sz="2000" dirty="0" smtClean="0">
                 <a:latin typeface="Times New Roman" pitchFamily="18" charset="0"/>
               </a:rPr>
-              <a:t> hope is astronomers will upload observed galaxy data to SOCM and </a:t>
-            </a:r>
-            <a:r>
-              <a:rPr lang="en-US" sz="2000" dirty="0" err="1" smtClean="0">
-                <a:latin typeface="Times New Roman" pitchFamily="18" charset="0"/>
-              </a:rPr>
-              <a:t>astrophysisists</a:t>
-            </a:r>
-            <a:r>
-              <a:rPr lang="en-US" sz="2000" dirty="0" smtClean="0">
-                <a:latin typeface="Times New Roman" pitchFamily="18" charset="0"/>
-              </a:rPr>
-              <a:t> will use RoCM to testing </a:t>
-            </a:r>
-            <a:r>
-              <a:rPr lang="en-US" sz="2000" dirty="0" err="1" smtClean="0">
-                <a:latin typeface="Times New Roman" pitchFamily="18" charset="0"/>
-              </a:rPr>
-              <a:t>existsing</a:t>
-            </a:r>
-            <a:r>
-              <a:rPr lang="en-US" sz="2000" dirty="0" smtClean="0">
-                <a:latin typeface="Times New Roman" pitchFamily="18" charset="0"/>
-              </a:rPr>
-              <a:t> and future galactic models to finally understand the dynamics of these giant collection of stars.</a:t>
+              <a:t> hope is astronomers will upload observed galaxy data to SOCM and astrophysicists will use RoCM to testing existing and future galactic models to finally understand the dynamics of these giant collection of stars.</a:t>
             </a:r>
           </a:p>
           <a:p>
@@ -2583,21 +2609,27 @@
               <a:rPr lang="en-US" sz="2000" dirty="0" smtClean="0">
                 <a:latin typeface="Times New Roman" pitchFamily="18" charset="0"/>
               </a:rPr>
-              <a:t>, where users can now view our database of collected measurements and developers may use our API endpoints to use in their own endeavors. RoCM, to be hosted at RotationCurve.org, should be </a:t>
-            </a:r>
-            <a:r>
-              <a:rPr lang="en-US" sz="2000" smtClean="0">
-                <a:latin typeface="Times New Roman" pitchFamily="18" charset="0"/>
-              </a:rPr>
-              <a:t>available </a:t>
-            </a:r>
-            <a:r>
-              <a:rPr lang="en-US" sz="2000" smtClean="0">
-                <a:latin typeface="Times New Roman" pitchFamily="18" charset="0"/>
-              </a:rPr>
-              <a:t>shortly.</a:t>
-            </a:r>
-            <a:endParaRPr lang="en-US" sz="1400" dirty="0">
+              <a:t>, where users can now view our database of collected measurements and developers may use our API endpoints to use in their own endeavors. </a:t>
+            </a:r>
+            <a:r>
+              <a:rPr lang="en-US" sz="2000" dirty="0" smtClean="0">
+                <a:latin typeface="Times New Roman" pitchFamily="18" charset="0"/>
+              </a:rPr>
+              <a:t>RoCM is hosted at rotationcurve.heroku.com and will be shortly moved to rotationcurve.wit.edu / rotationcurve.org. Each project is a contribution to the open source community and can </a:t>
+            </a:r>
+            <a:r>
+              <a:rPr lang="en-US" sz="2000" dirty="0">
+                <a:latin typeface="Times New Roman" pitchFamily="18" charset="0"/>
+              </a:rPr>
+              <a:t>be found here: </a:t>
+            </a:r>
+            <a:r>
+              <a:rPr lang="en-US" sz="2000" u="sng" dirty="0">
+                <a:latin typeface="Times New Roman" pitchFamily="18" charset="0"/>
+              </a:rPr>
+              <a:t>https://github.com/RoCMSOCM</a:t>
+            </a:r>
+            <a:endParaRPr lang="en-US" sz="1400" u="sng" dirty="0">
               <a:latin typeface="Times New Roman" pitchFamily="18" charset="0"/>
             </a:endParaRPr>
           </a:p>
@@ -2613,8 +2645,8 @@
         </p:nvSpPr>
         <p:spPr bwMode="auto">
           <a:xfrm>
-            <a:off x="624814" y="4221130"/>
-            <a:ext cx="7372350" cy="1004662"/>
+            <a:off x="624814" y="4323478"/>
+            <a:ext cx="7372350" cy="896940"/>
           </a:xfrm>
           <a:prstGeom prst="rect">
             <a:avLst/>
@@ -2635,13 +2667,13 @@
           <a:lstStyle/>
           <a:p>
             <a:r>
-              <a:rPr lang="en-US" b="1" dirty="0" smtClean="0">
+              <a:rPr lang="en-US" sz="5400" b="1" dirty="0" smtClean="0">
                 <a:latin typeface="+mj-lt"/>
                 <a:cs typeface="Times New Roman" pitchFamily="18" charset="0"/>
               </a:rPr>
               <a:t>Introduction</a:t>
             </a:r>
-            <a:endParaRPr lang="en-US" sz="3100" dirty="0">
+            <a:endParaRPr lang="en-US" sz="2400" dirty="0">
               <a:latin typeface="+mj-lt"/>
               <a:cs typeface="Times New Roman" pitchFamily="18" charset="0"/>
             </a:endParaRPr>
@@ -2691,8 +2723,8 @@
         </p:nvSpPr>
         <p:spPr bwMode="auto">
           <a:xfrm>
-            <a:off x="16800909" y="15903329"/>
-            <a:ext cx="7334250" cy="5298145"/>
+            <a:off x="16800908" y="15745466"/>
+            <a:ext cx="7334250" cy="5605922"/>
           </a:xfrm>
           <a:prstGeom prst="rect">
             <a:avLst/>
@@ -2718,133 +2750,98 @@
                 <a:latin typeface="Times New Roman" pitchFamily="18" charset="0"/>
                 <a:cs typeface="Times New Roman" pitchFamily="18" charset="0"/>
               </a:rPr>
-              <a:t>       </a:t>
+              <a:t>       RoCM was also built as a Ruby on Rails application, along with a number of JavaScript libraries and our SOCM application as its database. The single-page website consists of the following: quick-reference table of SOCM (to select galaxies to plot), a table of sliders to manipulate values calculated from </a:t>
+            </a:r>
+            <a:r>
+              <a:rPr lang="en-US" sz="2000" dirty="0" smtClean="0">
+                <a:latin typeface="Times New Roman" pitchFamily="18" charset="0"/>
+                <a:cs typeface="Times New Roman" pitchFamily="18" charset="0"/>
+              </a:rPr>
+              <a:t>galactic </a:t>
+            </a:r>
+            <a:r>
+              <a:rPr lang="en-US" sz="2000" dirty="0" smtClean="0">
+                <a:latin typeface="Times New Roman" pitchFamily="18" charset="0"/>
+                <a:cs typeface="Times New Roman" pitchFamily="18" charset="0"/>
+              </a:rPr>
+              <a:t>models (for </a:t>
+            </a:r>
+            <a:r>
+              <a:rPr lang="en-US" sz="2000" dirty="0" smtClean="0">
+                <a:latin typeface="Times New Roman" pitchFamily="18" charset="0"/>
+                <a:cs typeface="Times New Roman" pitchFamily="18" charset="0"/>
+              </a:rPr>
+              <a:t>parameter fitting purposes</a:t>
+            </a:r>
+            <a:r>
+              <a:rPr lang="en-US" sz="2000" dirty="0" smtClean="0">
+                <a:latin typeface="Times New Roman" pitchFamily="18" charset="0"/>
+                <a:cs typeface="Times New Roman" pitchFamily="18" charset="0"/>
+              </a:rPr>
+              <a:t>), a </a:t>
+            </a:r>
+            <a:r>
+              <a:rPr lang="en-US" sz="2000" dirty="0" smtClean="0">
+                <a:latin typeface="Times New Roman" pitchFamily="18" charset="0"/>
+                <a:cs typeface="Times New Roman" pitchFamily="18" charset="0"/>
+              </a:rPr>
+              <a:t>rotation </a:t>
+            </a:r>
+            <a:r>
+              <a:rPr lang="en-US" sz="2000" dirty="0">
+                <a:latin typeface="Times New Roman" pitchFamily="18" charset="0"/>
+                <a:cs typeface="Times New Roman" pitchFamily="18" charset="0"/>
+              </a:rPr>
+              <a:t>v</a:t>
+            </a:r>
+            <a:r>
+              <a:rPr lang="en-US" sz="2000" dirty="0" smtClean="0">
+                <a:latin typeface="Times New Roman" pitchFamily="18" charset="0"/>
+                <a:cs typeface="Times New Roman" pitchFamily="18" charset="0"/>
+              </a:rPr>
+              <a:t>elocity over </a:t>
+            </a:r>
+            <a:r>
+              <a:rPr lang="en-US" sz="2000" dirty="0" smtClean="0">
+                <a:latin typeface="Times New Roman" pitchFamily="18" charset="0"/>
+                <a:cs typeface="Times New Roman" pitchFamily="18" charset="0"/>
+              </a:rPr>
+              <a:t>galactocentric </a:t>
+            </a:r>
+            <a:r>
+              <a:rPr lang="en-US" sz="2000" dirty="0" smtClean="0">
+                <a:latin typeface="Times New Roman" pitchFamily="18" charset="0"/>
+                <a:cs typeface="Times New Roman" pitchFamily="18" charset="0"/>
+              </a:rPr>
+              <a:t>distance graph to plot models against collected data, a button to save the </a:t>
+            </a:r>
+            <a:r>
+              <a:rPr lang="en-US" sz="2000" dirty="0" smtClean="0">
+                <a:latin typeface="Times New Roman" pitchFamily="18" charset="0"/>
+                <a:cs typeface="Times New Roman" pitchFamily="18" charset="0"/>
+              </a:rPr>
+              <a:t>graph as an SVG (Scalable Vector Graphic), </a:t>
+            </a:r>
+            <a:r>
+              <a:rPr lang="en-US" sz="2000" dirty="0" smtClean="0">
+                <a:latin typeface="Times New Roman" pitchFamily="18" charset="0"/>
+                <a:cs typeface="Times New Roman" pitchFamily="18" charset="0"/>
+              </a:rPr>
+              <a:t>a button to send the selected model to RoCS, a section for users to import their own models to use on the graph, and a section for users to import their models in </a:t>
             </a:r>
             <a:r>
               <a:rPr lang="en-US" sz="2000" dirty="0" err="1" smtClean="0">
                 <a:latin typeface="Times New Roman" pitchFamily="18" charset="0"/>
                 <a:cs typeface="Times New Roman" pitchFamily="18" charset="0"/>
               </a:rPr>
-              <a:t>RoCM</a:t>
+              <a:t>LaTeX</a:t>
             </a:r>
             <a:r>
               <a:rPr lang="en-US" sz="2000" dirty="0" smtClean="0">
                 <a:latin typeface="Times New Roman" pitchFamily="18" charset="0"/>
                 <a:cs typeface="Times New Roman" pitchFamily="18" charset="0"/>
               </a:rPr>
-              <a:t> was also built as a Ruby on Rails application, along with a number of JavaScript libraries and our SOCM application as its database. The single-page website consists of the following: quick-reference table of SOCM (to select galaxies to plot), a table of sliders to manipulate values calculated from </a:t>
-            </a:r>
-            <a:r>
-              <a:rPr lang="en-US" sz="2000" dirty="0" smtClean="0">
-                <a:latin typeface="Times New Roman" pitchFamily="18" charset="0"/>
-                <a:cs typeface="Times New Roman" pitchFamily="18" charset="0"/>
-              </a:rPr>
-              <a:t>galactic </a:t>
-            </a:r>
-            <a:r>
-              <a:rPr lang="en-US" sz="2000" dirty="0" smtClean="0">
-                <a:latin typeface="Times New Roman" pitchFamily="18" charset="0"/>
-                <a:cs typeface="Times New Roman" pitchFamily="18" charset="0"/>
-              </a:rPr>
-              <a:t>models (for </a:t>
-            </a:r>
-            <a:r>
-              <a:rPr lang="en-US" sz="2000" dirty="0" smtClean="0">
-                <a:latin typeface="Times New Roman" pitchFamily="18" charset="0"/>
-                <a:cs typeface="Times New Roman" pitchFamily="18" charset="0"/>
-              </a:rPr>
-              <a:t>parameter fitting purposes</a:t>
-            </a:r>
-            <a:r>
-              <a:rPr lang="en-US" sz="2000" dirty="0" smtClean="0">
-                <a:latin typeface="Times New Roman" pitchFamily="18" charset="0"/>
-                <a:cs typeface="Times New Roman" pitchFamily="18" charset="0"/>
-              </a:rPr>
-              <a:t>), a </a:t>
-            </a:r>
-            <a:r>
-              <a:rPr lang="en-US" sz="2000" dirty="0" smtClean="0">
-                <a:latin typeface="Times New Roman" pitchFamily="18" charset="0"/>
-                <a:cs typeface="Times New Roman" pitchFamily="18" charset="0"/>
-              </a:rPr>
-              <a:t>rotation </a:t>
-            </a:r>
-            <a:r>
-              <a:rPr lang="en-US" sz="2000" dirty="0">
-                <a:latin typeface="Times New Roman" pitchFamily="18" charset="0"/>
-                <a:cs typeface="Times New Roman" pitchFamily="18" charset="0"/>
-              </a:rPr>
-              <a:t>v</a:t>
-            </a:r>
-            <a:r>
-              <a:rPr lang="en-US" sz="2000" dirty="0" smtClean="0">
-                <a:latin typeface="Times New Roman" pitchFamily="18" charset="0"/>
-                <a:cs typeface="Times New Roman" pitchFamily="18" charset="0"/>
-              </a:rPr>
-              <a:t>elocity over </a:t>
-            </a:r>
-            <a:r>
-              <a:rPr lang="en-US" sz="2000" dirty="0" err="1" smtClean="0">
-                <a:latin typeface="Times New Roman" pitchFamily="18" charset="0"/>
-                <a:cs typeface="Times New Roman" pitchFamily="18" charset="0"/>
-              </a:rPr>
-              <a:t>galactocentric</a:t>
-            </a:r>
-            <a:r>
-              <a:rPr lang="en-US" sz="2000" dirty="0" smtClean="0">
-                <a:latin typeface="Times New Roman" pitchFamily="18" charset="0"/>
-                <a:cs typeface="Times New Roman" pitchFamily="18" charset="0"/>
-              </a:rPr>
-              <a:t> </a:t>
-            </a:r>
-            <a:r>
-              <a:rPr lang="en-US" sz="2000" dirty="0" smtClean="0">
-                <a:latin typeface="Times New Roman" pitchFamily="18" charset="0"/>
-                <a:cs typeface="Times New Roman" pitchFamily="18" charset="0"/>
-              </a:rPr>
-              <a:t>distance graph to plot models against collected data, a button to save the graph, a button to send the selected model to </a:t>
-            </a:r>
-            <a:r>
-              <a:rPr lang="en-US" sz="2000" dirty="0" err="1" smtClean="0">
-                <a:latin typeface="Times New Roman" pitchFamily="18" charset="0"/>
-                <a:cs typeface="Times New Roman" pitchFamily="18" charset="0"/>
-              </a:rPr>
-              <a:t>RoCS</a:t>
-            </a:r>
-            <a:r>
-              <a:rPr lang="en-US" sz="2000" dirty="0" smtClean="0">
-                <a:latin typeface="Times New Roman" pitchFamily="18" charset="0"/>
-                <a:cs typeface="Times New Roman" pitchFamily="18" charset="0"/>
-              </a:rPr>
-              <a:t>, a section for users to import their own models to use on the graph, and a section for users to import their models in </a:t>
-            </a:r>
-            <a:r>
-              <a:rPr lang="en-US" sz="2000" dirty="0" err="1" smtClean="0">
-                <a:latin typeface="Times New Roman" pitchFamily="18" charset="0"/>
-                <a:cs typeface="Times New Roman" pitchFamily="18" charset="0"/>
-              </a:rPr>
-              <a:t>LaTeX</a:t>
-            </a:r>
-            <a:r>
-              <a:rPr lang="en-US" sz="2000" dirty="0" smtClean="0">
-                <a:latin typeface="Times New Roman" pitchFamily="18" charset="0"/>
-                <a:cs typeface="Times New Roman" pitchFamily="18" charset="0"/>
-              </a:rPr>
-              <a:t> format. These tools all contribute to the powerful functionality we’ve provided in </a:t>
-            </a:r>
-            <a:r>
-              <a:rPr lang="en-US" sz="2000" dirty="0" err="1" smtClean="0">
-                <a:latin typeface="Times New Roman" pitchFamily="18" charset="0"/>
-                <a:cs typeface="Times New Roman" pitchFamily="18" charset="0"/>
-              </a:rPr>
-              <a:t>RoCM</a:t>
-            </a:r>
-            <a:r>
-              <a:rPr lang="en-US" sz="2000" dirty="0" smtClean="0">
-                <a:latin typeface="Times New Roman" pitchFamily="18" charset="0"/>
-                <a:cs typeface="Times New Roman" pitchFamily="18" charset="0"/>
-              </a:rPr>
-              <a:t>.</a:t>
+              <a:t> format. These tools all contribute to the powerful functionality we’ve provided in RoCM.</a:t>
             </a:r>
           </a:p>
           <a:p>
@@ -2896,21 +2893,7 @@
                 <a:latin typeface="Times New Roman" pitchFamily="18" charset="0"/>
                 <a:cs typeface="Times New Roman" pitchFamily="18" charset="0"/>
               </a:rPr>
-              <a:t>) to pull data from SOCM. The D3 library then helps us translate and manipulate that data to create the rich graphs and tables provided in </a:t>
-            </a:r>
-            <a:r>
-              <a:rPr lang="en-US" sz="2000" dirty="0" err="1" smtClean="0">
-                <a:latin typeface="Times New Roman" pitchFamily="18" charset="0"/>
-                <a:cs typeface="Times New Roman" pitchFamily="18" charset="0"/>
-              </a:rPr>
-              <a:t>RoCM</a:t>
-            </a:r>
-            <a:r>
-              <a:rPr lang="en-US" sz="2000" dirty="0" smtClean="0">
-                <a:latin typeface="Times New Roman" pitchFamily="18" charset="0"/>
-                <a:cs typeface="Times New Roman" pitchFamily="18" charset="0"/>
-              </a:rPr>
-              <a:t>.</a:t>
+              <a:t>) to pull data from SOCM. The D3 library then helps us translate and manipulate that data to create the rich graphs and tables provided in RoCM.</a:t>
             </a:r>
             <a:endParaRPr lang="en-US" sz="2000" dirty="0">
               <a:latin typeface="Times New Roman" pitchFamily="18" charset="0"/>
@@ -2927,15 +2910,22 @@
           </p:cNvPicPr>
           <p:nvPr/>
         </p:nvPicPr>
-        <p:blipFill rotWithShape="1">
-          <a:blip r:embed="rId4"/>
-          <a:srcRect b="12991"/>
-          <a:stretch/>
+        <p:blipFill>
+          <a:blip r:embed="rId4">
+            <a:extLst>
+              <a:ext uri="{28A0092B-C50C-407E-A947-70E740481C1C}">
+                <a14:useLocalDpi xmlns:a14="http://schemas.microsoft.com/office/drawing/2010/main" val="0"/>
+              </a:ext>
+            </a:extLst>
+          </a:blip>
+          <a:stretch>
+            <a:fillRect/>
+          </a:stretch>
         </p:blipFill>
         <p:spPr>
           <a:xfrm>
-            <a:off x="8706453" y="11989034"/>
-            <a:ext cx="7352697" cy="3598638"/>
+            <a:off x="9495500" y="12062329"/>
+            <a:ext cx="5754946" cy="3598638"/>
           </a:xfrm>
           <a:prstGeom prst="rect">
             <a:avLst/>
@@ -2957,8 +2947,8 @@
         </p:nvSpPr>
         <p:spPr bwMode="auto">
           <a:xfrm>
-            <a:off x="16647982" y="14705392"/>
-            <a:ext cx="7372350" cy="1004662"/>
+            <a:off x="16647982" y="14665522"/>
+            <a:ext cx="7372350" cy="896940"/>
           </a:xfrm>
           <a:prstGeom prst="rect">
             <a:avLst/>
@@ -2984,10 +2974,10 @@
               </a:spcBef>
             </a:pPr>
             <a:r>
-              <a:rPr lang="en-US" b="1" dirty="0" smtClean="0"/>
+              <a:rPr lang="en-US" sz="5400" b="1" dirty="0" smtClean="0"/>
               <a:t>Implementation</a:t>
             </a:r>
-            <a:endParaRPr lang="en-US" b="1" dirty="0"/>
+            <a:endParaRPr lang="en-US" sz="5400" b="1" dirty="0"/>
           </a:p>
         </p:txBody>
       </p:sp>
@@ -3067,8 +3057,8 @@
         </p:blipFill>
         <p:spPr>
           <a:xfrm>
-            <a:off x="24917400" y="7660696"/>
-            <a:ext cx="7282680" cy="3380821"/>
+            <a:off x="24917400" y="7595528"/>
+            <a:ext cx="7282680" cy="3379163"/>
           </a:xfrm>
           <a:prstGeom prst="rect">
             <a:avLst/>
@@ -3127,7 +3117,7 @@
           </p:cNvPicPr>
           <p:nvPr/>
         </p:nvPicPr>
-        <p:blipFill rotWithShape="1">
+        <p:blipFill>
           <a:blip r:embed="rId7">
             <a:extLst>
               <a:ext uri="{28A0092B-C50C-407E-A947-70E740481C1C}">
@@ -3135,13 +3125,14 @@
               </a:ext>
             </a:extLst>
           </a:blip>
-          <a:srcRect b="2907"/>
-          <a:stretch/>
+          <a:stretch>
+            <a:fillRect/>
+          </a:stretch>
         </p:blipFill>
         <p:spPr>
           <a:xfrm>
-            <a:off x="8878265" y="17415743"/>
-            <a:ext cx="7064280" cy="3720956"/>
+            <a:off x="8869410" y="17621149"/>
+            <a:ext cx="7064280" cy="3449162"/>
           </a:xfrm>
           <a:prstGeom prst="rect">
             <a:avLst/>
@@ -3163,7 +3154,7 @@
         </p:nvSpPr>
         <p:spPr bwMode="auto">
           <a:xfrm>
-            <a:off x="8573801" y="15800193"/>
+            <a:off x="8573800" y="15900200"/>
             <a:ext cx="7598347" cy="1481716"/>
           </a:xfrm>
           <a:prstGeom prst="rect">
@@ -3218,7 +3209,7 @@
         </p:blipFill>
         <p:spPr>
           <a:xfrm>
-            <a:off x="25178926" y="11261700"/>
+            <a:off x="25178926" y="11143669"/>
             <a:ext cx="6722682" cy="3871881"/>
           </a:xfrm>
           <a:prstGeom prst="rect">
@@ -3248,7 +3239,7 @@
         </p:blipFill>
         <p:spPr>
           <a:xfrm>
-            <a:off x="1123776" y="17915619"/>
+            <a:off x="1156309" y="18370010"/>
             <a:ext cx="6309360" cy="2743200"/>
           </a:xfrm>
           <a:prstGeom prst="rect">
@@ -3283,7 +3274,7 @@
         </p:blipFill>
         <p:spPr>
           <a:xfrm>
-            <a:off x="1184495" y="14672543"/>
+            <a:off x="1188720" y="15332568"/>
             <a:ext cx="6309360" cy="2743200"/>
           </a:xfrm>
           <a:prstGeom prst="rect">
@@ -3434,7 +3425,7 @@
         </p:nvSpPr>
         <p:spPr bwMode="auto">
           <a:xfrm>
-            <a:off x="24834651" y="5061892"/>
+            <a:off x="24834651" y="5128035"/>
             <a:ext cx="7334250" cy="2220380"/>
           </a:xfrm>
           <a:prstGeom prst="rect">
@@ -3461,40 +3452,56 @@
                 <a:latin typeface="Times New Roman" pitchFamily="18" charset="0"/>
                 <a:cs typeface="Times New Roman" pitchFamily="18" charset="0"/>
               </a:rPr>
-              <a:t>        </a:t>
-            </a:r>
-            <a:r>
-              <a:rPr lang="en-US" sz="2000" dirty="0" err="1" smtClean="0">
-                <a:latin typeface="Times New Roman" pitchFamily="18" charset="0"/>
-                <a:cs typeface="Times New Roman" pitchFamily="18" charset="0"/>
-              </a:rPr>
-              <a:t>RoCS</a:t>
-            </a:r>
-            <a:r>
-              <a:rPr lang="en-US" sz="2000" dirty="0" smtClean="0">
-                <a:latin typeface="Times New Roman" pitchFamily="18" charset="0"/>
-                <a:cs typeface="Times New Roman" pitchFamily="18" charset="0"/>
-              </a:rPr>
-              <a:t> provides a way to visualize the spin of the galaxy in question. The user can simulate either just the observational data, or a specified model against the data. The color scale represent the relative minimum and maximum velocity for the stars around the center of the galaxy. The scale helps recognize when the rotation curve simulation of a model doesn’t match up with the observational data (see the </a:t>
-            </a:r>
-            <a:r>
-              <a:rPr lang="en-US" sz="2000" dirty="0" err="1" smtClean="0">
-                <a:latin typeface="Times New Roman" pitchFamily="18" charset="0"/>
-                <a:cs typeface="Times New Roman" pitchFamily="18" charset="0"/>
-              </a:rPr>
-              <a:t>RoCS</a:t>
-            </a:r>
-            <a:r>
-              <a:rPr lang="en-US" sz="2000" dirty="0" smtClean="0">
-                <a:latin typeface="Times New Roman" pitchFamily="18" charset="0"/>
-                <a:cs typeface="Times New Roman" pitchFamily="18" charset="0"/>
-              </a:rPr>
-              <a:t> webpage for the animation of the full rotation simulation).</a:t>
+              <a:t>        RoCS provides a way to visualize the spin of the galaxy in question. The user can simulate either just the observational data, or a specified model against the data. The color scale represent the relative minimum and maximum velocity for the stars around the center of the galaxy. The scale helps recognize when the rotation curve simulation of a model doesn’t match up with the observational data (see the RoCS webpage for the animation of the full rotation simulation).</a:t>
             </a:r>
             <a:endParaRPr lang="en-US" sz="2000" dirty="0">
               <a:latin typeface="Times New Roman" pitchFamily="18" charset="0"/>
               <a:cs typeface="Times New Roman" pitchFamily="18" charset="0"/>
             </a:endParaRPr>
+          </a:p>
+        </p:txBody>
+      </p:sp>
+      <p:sp>
+        <p:nvSpPr>
+          <p:cNvPr id="46" name="Text Box 19"/>
+          <p:cNvSpPr txBox="1">
+            <a:spLocks noChangeArrowheads="1"/>
+          </p:cNvSpPr>
+          <p:nvPr/>
+        </p:nvSpPr>
+        <p:spPr bwMode="auto">
+          <a:xfrm>
+            <a:off x="572534" y="14377828"/>
+            <a:ext cx="7598347" cy="773830"/>
+          </a:xfrm>
+          <a:prstGeom prst="rect">
+            <a:avLst/>
+          </a:prstGeom>
+          <a:noFill/>
+          <a:ln w="9525">
+            <a:noFill/>
+            <a:miter lim="800000"/>
+            <a:headEnd/>
+            <a:tailEnd/>
+          </a:ln>
+          <a:effectLst/>
+        </p:spPr>
+        <p:txBody>
+          <a:bodyPr wrap="square" lIns="65306" tIns="32653" rIns="65306" bIns="32653">
+            <a:spAutoFit/>
+          </a:bodyPr>
+          <a:lstStyle/>
+          <a:p>
+            <a:pPr defTabSz="3134937">
+              <a:spcBef>
+                <a:spcPct val="50000"/>
+              </a:spcBef>
+            </a:pPr>
+            <a:r>
+              <a:rPr lang="en-US" sz="4600" b="1" dirty="0" smtClean="0"/>
+              <a:t>Example Rotation Curves</a:t>
+            </a:r>
+            <a:endParaRPr lang="en-US" sz="4600" b="1" dirty="0" smtClean="0"/>
           </a:p>
         </p:txBody>
       </p:sp>

</xml_diff>